<commit_message>
docs: Se modifican documentos
</commit_message>
<xml_diff>
--- a/1- Analisis/1- Presentación/01 - Versión_2/Presentación_Componente_Metodologico_2.pptx
+++ b/1- Analisis/1- Presentación/01 - Versión_2/Presentación_Componente_Metodologico_2.pptx
@@ -22098,7 +22098,7 @@
         <p:push dir="r"/>
       </p:transition>
     </mc:Choice>
-    <mc:Fallback xmlns:p15="http://schemas.microsoft.com/office/powerpoint/2012/main" xmlns:com="http://schemas.openxmlformats.org/drawingml/2006/compatibility" xmlns:pvml="urn:schemas-microsoft-com:office:powerpoint" xmlns:v="urn:schemas-microsoft-com:vml" xmlns:o="urn:schemas-microsoft-com:office:office" xmlns:dgm="http://schemas.openxmlformats.org/drawingml/2006/diagram" xmlns:c="http://schemas.openxmlformats.org/drawingml/2006/chart" xmlns:mv="urn:schemas-microsoft-com:mac:vml" xmlns="">
+    <mc:Fallback xmlns="" xmlns:mv="urn:schemas-microsoft-com:mac:vml" xmlns:c="http://schemas.openxmlformats.org/drawingml/2006/chart" xmlns:dgm="http://schemas.openxmlformats.org/drawingml/2006/diagram" xmlns:o="urn:schemas-microsoft-com:office:office" xmlns:v="urn:schemas-microsoft-com:vml" xmlns:pvml="urn:schemas-microsoft-com:office:powerpoint" xmlns:com="http://schemas.openxmlformats.org/drawingml/2006/compatibility" xmlns:p15="http://schemas.microsoft.com/office/powerpoint/2012/main">
       <p:transition spd="slow">
         <p:fade/>
       </p:transition>
@@ -23657,7 +23657,7 @@
         <p:push dir="r"/>
       </p:transition>
     </mc:Choice>
-    <mc:Fallback xmlns:p15="http://schemas.microsoft.com/office/powerpoint/2012/main" xmlns:com="http://schemas.openxmlformats.org/drawingml/2006/compatibility" xmlns:pvml="urn:schemas-microsoft-com:office:powerpoint" xmlns:v="urn:schemas-microsoft-com:vml" xmlns:o="urn:schemas-microsoft-com:office:office" xmlns:dgm="http://schemas.openxmlformats.org/drawingml/2006/diagram" xmlns:c="http://schemas.openxmlformats.org/drawingml/2006/chart" xmlns:mv="urn:schemas-microsoft-com:mac:vml" xmlns="">
+    <mc:Fallback xmlns="" xmlns:mv="urn:schemas-microsoft-com:mac:vml" xmlns:c="http://schemas.openxmlformats.org/drawingml/2006/chart" xmlns:dgm="http://schemas.openxmlformats.org/drawingml/2006/diagram" xmlns:o="urn:schemas-microsoft-com:office:office" xmlns:v="urn:schemas-microsoft-com:vml" xmlns:pvml="urn:schemas-microsoft-com:office:powerpoint" xmlns:com="http://schemas.openxmlformats.org/drawingml/2006/compatibility" xmlns:p15="http://schemas.microsoft.com/office/powerpoint/2012/main">
       <p:transition spd="slow">
         <p:fade/>
       </p:transition>
@@ -25625,36 +25625,32 @@
       </p:sp>
       <p:pic>
         <p:nvPicPr>
-          <p:cNvPr id="218" name="Google Shape;218;p41"/>
-          <p:cNvPicPr preferRelativeResize="0"/>
+          <p:cNvPr id="3" name="Imagen 2">
+            <a:extLst>
+              <a:ext uri="{FF2B5EF4-FFF2-40B4-BE49-F238E27FC236}">
+                <a16:creationId xmlns:a16="http://schemas.microsoft.com/office/drawing/2014/main" id="{8FC1E856-D711-434E-862D-3BB4BA0CC94A}"/>
+              </a:ext>
+            </a:extLst>
+          </p:cNvPr>
+          <p:cNvPicPr>
+            <a:picLocks noChangeAspect="1"/>
+          </p:cNvPicPr>
           <p:nvPr/>
         </p:nvPicPr>
         <p:blipFill>
-          <a:blip r:embed="rId3">
-            <a:alphaModFix/>
-          </a:blip>
+          <a:blip r:embed="rId3"/>
           <a:stretch>
             <a:fillRect/>
           </a:stretch>
         </p:blipFill>
         <p:spPr>
           <a:xfrm>
-            <a:off x="5916925" y="2704875"/>
-            <a:ext cx="1858900" cy="1844525"/>
+            <a:off x="5938684" y="2689737"/>
+            <a:ext cx="1573161" cy="1573161"/>
           </a:xfrm>
           <a:prstGeom prst="rect">
             <a:avLst/>
           </a:prstGeom>
-          <a:noFill/>
-          <a:ln w="9525" cap="flat" cmpd="sng">
-            <a:solidFill>
-              <a:srgbClr val="F3F3F3"/>
-            </a:solidFill>
-            <a:prstDash val="solid"/>
-            <a:round/>
-            <a:headEnd type="none" w="sm" len="sm"/>
-            <a:tailEnd type="none" w="sm" len="sm"/>
-          </a:ln>
         </p:spPr>
       </p:pic>
     </p:spTree>

</xml_diff>